<commit_message>
màj diagramme des classes
</commit_message>
<xml_diff>
--- a/doc/PrésentationSoutenance.pptx
+++ b/doc/PrésentationSoutenance.pptx
@@ -11858,19 +11858,17 @@
       </p:grpSpPr>
       <p:pic>
         <p:nvPicPr>
-          <p:cNvPr id="4" name="Espace réservé du contenu 3">
+          <p:cNvPr id="1026" name="Picture 2">
             <a:extLst>
               <a:ext uri="{FF2B5EF4-FFF2-40B4-BE49-F238E27FC236}">
-                <a16:creationId xmlns:a16="http://schemas.microsoft.com/office/drawing/2014/main" id="{854FAD7B-162C-40C3-8D91-DA6E3AAEB22D}"/>
+                <a16:creationId xmlns:a16="http://schemas.microsoft.com/office/drawing/2014/main" id="{3D18AE9D-7CDB-44E0-8AED-620627DDF528}"/>
               </a:ext>
             </a:extLst>
           </p:cNvPr>
           <p:cNvPicPr>
-            <a:picLocks noGrp="1" noChangeAspect="1"/>
+            <a:picLocks noChangeAspect="1" noChangeArrowheads="1"/>
           </p:cNvPicPr>
-          <p:nvPr>
-            <p:ph idx="1"/>
-          </p:nvPr>
+          <p:nvPr/>
         </p:nvPicPr>
         <p:blipFill>
           <a:blip r:embed="rId2">
@@ -11880,15 +11878,29 @@
               </a:ext>
             </a:extLst>
           </a:blip>
+          <a:srcRect/>
           <a:stretch>
             <a:fillRect/>
           </a:stretch>
         </p:blipFill>
-        <p:spPr>
+        <p:spPr bwMode="auto">
           <a:xfrm>
-            <a:off x="2532844" y="0"/>
-            <a:ext cx="6691044" cy="6858000"/>
+            <a:off x="2500313" y="0"/>
+            <a:ext cx="7191375" cy="6858000"/>
           </a:xfrm>
+          <a:prstGeom prst="rect">
+            <a:avLst/>
+          </a:prstGeom>
+          <a:noFill/>
+          <a:extLst>
+            <a:ext uri="{909E8E84-426E-40DD-AFC4-6F175D3DCCD1}">
+              <a14:hiddenFill xmlns:a14="http://schemas.microsoft.com/office/drawing/2010/main">
+                <a:solidFill>
+                  <a:srgbClr val="FFFFFF"/>
+                </a:solidFill>
+              </a14:hiddenFill>
+            </a:ext>
+          </a:extLst>
         </p:spPr>
       </p:pic>
     </p:spTree>

</xml_diff>